<commit_message>
strategies B_2 and C_2 functioning
</commit_message>
<xml_diff>
--- a/Documentation/5. Heuristic classifier strategy B.pptx
+++ b/Documentation/5. Heuristic classifier strategy B.pptx
@@ -227,7 +227,7 @@
           <a:p>
             <a:fld id="{1A21894F-B278-4D96-9594-A030EA633187}" type="datetimeFigureOut">
               <a:rPr lang="it-IT" smtClean="0"/>
-              <a:t>01/11/2024</a:t>
+              <a:t>02/11/2024</a:t>
             </a:fld>
             <a:endParaRPr lang="it-IT"/>
           </a:p>
@@ -4099,7 +4099,7 @@
           <a:p>
             <a:fld id="{58E4D78B-0F35-4E3B-A0B9-554BA787D8A4}" type="datetime1">
               <a:rPr lang="en-US" smtClean="0"/>
-              <a:t>11/1/2024</a:t>
+              <a:t>11/2/2024</a:t>
             </a:fld>
             <a:endParaRPr lang="en-US"/>
           </a:p>
@@ -4309,7 +4309,7 @@
           <a:p>
             <a:fld id="{604487E5-BE79-4BAC-AEB7-0CE0533B5E5C}" type="datetime1">
               <a:rPr lang="en-US" smtClean="0"/>
-              <a:t>11/1/2024</a:t>
+              <a:t>11/2/2024</a:t>
             </a:fld>
             <a:endParaRPr lang="en-US"/>
           </a:p>
@@ -4509,7 +4509,7 @@
           <a:p>
             <a:fld id="{DDA7E0CB-9E21-49FD-99A0-0CD75BBC45F4}" type="datetime1">
               <a:rPr lang="en-US" smtClean="0"/>
-              <a:t>11/1/2024</a:t>
+              <a:t>11/2/2024</a:t>
             </a:fld>
             <a:endParaRPr lang="en-US"/>
           </a:p>
@@ -4785,7 +4785,7 @@
           <a:p>
             <a:fld id="{661D7149-FE96-419A-8F67-9BD351842985}" type="datetime1">
               <a:rPr lang="en-US" smtClean="0"/>
-              <a:t>11/1/2024</a:t>
+              <a:t>11/2/2024</a:t>
             </a:fld>
             <a:endParaRPr lang="en-US"/>
           </a:p>
@@ -5053,7 +5053,7 @@
           <a:p>
             <a:fld id="{6CA97CEF-DD94-4A20-85BC-5094F3EA8887}" type="datetime1">
               <a:rPr lang="en-US" smtClean="0"/>
-              <a:t>11/1/2024</a:t>
+              <a:t>11/2/2024</a:t>
             </a:fld>
             <a:endParaRPr lang="en-US"/>
           </a:p>
@@ -5468,7 +5468,7 @@
           <a:p>
             <a:fld id="{9862EB4C-45F8-47BA-B435-B6097D61B684}" type="datetime1">
               <a:rPr lang="en-US" smtClean="0"/>
-              <a:t>11/1/2024</a:t>
+              <a:t>11/2/2024</a:t>
             </a:fld>
             <a:endParaRPr lang="en-US"/>
           </a:p>
@@ -5610,7 +5610,7 @@
           <a:p>
             <a:fld id="{FA7CD0E2-B7EC-4D81-9389-8F889EE865AB}" type="datetime1">
               <a:rPr lang="en-US" smtClean="0"/>
-              <a:t>11/1/2024</a:t>
+              <a:t>11/2/2024</a:t>
             </a:fld>
             <a:endParaRPr lang="en-US"/>
           </a:p>
@@ -5723,7 +5723,7 @@
           <a:p>
             <a:fld id="{18B47F5C-7FA0-44DA-BF82-413AB90208B7}" type="datetime1">
               <a:rPr lang="en-US" smtClean="0"/>
-              <a:t>11/1/2024</a:t>
+              <a:t>11/2/2024</a:t>
             </a:fld>
             <a:endParaRPr lang="en-US"/>
           </a:p>
@@ -6036,7 +6036,7 @@
           <a:p>
             <a:fld id="{403415A8-F8BD-47CC-8D20-53798396961D}" type="datetime1">
               <a:rPr lang="en-US" smtClean="0"/>
-              <a:t>11/1/2024</a:t>
+              <a:t>11/2/2024</a:t>
             </a:fld>
             <a:endParaRPr lang="en-US"/>
           </a:p>
@@ -6325,7 +6325,7 @@
           <a:p>
             <a:fld id="{6A12F5A1-6669-4CDD-B1B4-04FFE5C41ADE}" type="datetime1">
               <a:rPr lang="en-US" smtClean="0"/>
-              <a:t>11/1/2024</a:t>
+              <a:t>11/2/2024</a:t>
             </a:fld>
             <a:endParaRPr lang="en-US"/>
           </a:p>
@@ -6529,7 +6529,7 @@
           <a:p>
             <a:fld id="{63421662-C242-4258-8799-9F32C0D7CC75}" type="datetime1">
               <a:rPr lang="en-US" smtClean="0"/>
-              <a:t>11/1/2024</a:t>
+              <a:t>11/2/2024</a:t>
             </a:fld>
             <a:endParaRPr lang="en-US"/>
           </a:p>
@@ -12161,6 +12161,58 @@
           </a:fontRef>
         </p:style>
       </p:cxnSp>
+      <p:sp>
+        <p:nvSpPr>
+          <p:cNvPr id="3" name="Rettangolo con angoli arrotondati 2">
+            <a:extLst>
+              <a:ext uri="{FF2B5EF4-FFF2-40B4-BE49-F238E27FC236}">
+                <a16:creationId xmlns:a16="http://schemas.microsoft.com/office/drawing/2014/main" id="{D1C37B4A-104E-3987-061F-BE44F74D824C}"/>
+              </a:ext>
+            </a:extLst>
+          </p:cNvPr>
+          <p:cNvSpPr/>
+          <p:nvPr/>
+        </p:nvSpPr>
+        <p:spPr>
+          <a:xfrm>
+            <a:off x="8408231" y="5332490"/>
+            <a:ext cx="2945569" cy="950976"/>
+          </a:xfrm>
+          <a:prstGeom prst="roundRect">
+            <a:avLst/>
+          </a:prstGeom>
+        </p:spPr>
+        <p:style>
+          <a:lnRef idx="1">
+            <a:schemeClr val="accent3"/>
+          </a:lnRef>
+          <a:fillRef idx="2">
+            <a:schemeClr val="accent3"/>
+          </a:fillRef>
+          <a:effectRef idx="1">
+            <a:schemeClr val="accent3"/>
+          </a:effectRef>
+          <a:fontRef idx="minor">
+            <a:schemeClr val="dk1"/>
+          </a:fontRef>
+        </p:style>
+        <p:txBody>
+          <a:bodyPr rtlCol="0" anchor="ctr"/>
+          <a:lstStyle/>
+          <a:p>
+            <a:r>
+              <a:rPr lang="en-GB" sz="1100" dirty="0">
+                <a:solidFill>
+                  <a:schemeClr val="bg1">
+                    <a:lumMod val="50000"/>
+                  </a:schemeClr>
+                </a:solidFill>
+              </a:rPr>
+              <a:t>If train/test split is done, the threshold is evaluated one time for all. On the other hand, in case of LOPO CV, threshold is evaluated iteratively on the train set of the current iteration. See appendix 1.</a:t>
+            </a:r>
+          </a:p>
+        </p:txBody>
+      </p:sp>
     </p:spTree>
     <p:extLst>
       <p:ext uri="{BB962C8B-B14F-4D97-AF65-F5344CB8AC3E}">
@@ -15501,6 +15553,58 @@
           </a:prstGeom>
         </p:spPr>
       </p:pic>
+      <p:sp>
+        <p:nvSpPr>
+          <p:cNvPr id="3" name="Rettangolo con angoli arrotondati 2">
+            <a:extLst>
+              <a:ext uri="{FF2B5EF4-FFF2-40B4-BE49-F238E27FC236}">
+                <a16:creationId xmlns:a16="http://schemas.microsoft.com/office/drawing/2014/main" id="{E3BFB039-8997-8846-9ADF-6942D0AA8325}"/>
+              </a:ext>
+            </a:extLst>
+          </p:cNvPr>
+          <p:cNvSpPr/>
+          <p:nvPr/>
+        </p:nvSpPr>
+        <p:spPr>
+          <a:xfrm>
+            <a:off x="8431414" y="5705527"/>
+            <a:ext cx="2945569" cy="577939"/>
+          </a:xfrm>
+          <a:prstGeom prst="roundRect">
+            <a:avLst/>
+          </a:prstGeom>
+        </p:spPr>
+        <p:style>
+          <a:lnRef idx="1">
+            <a:schemeClr val="accent3"/>
+          </a:lnRef>
+          <a:fillRef idx="2">
+            <a:schemeClr val="accent3"/>
+          </a:fillRef>
+          <a:effectRef idx="1">
+            <a:schemeClr val="accent3"/>
+          </a:effectRef>
+          <a:fontRef idx="minor">
+            <a:schemeClr val="dk1"/>
+          </a:fontRef>
+        </p:style>
+        <p:txBody>
+          <a:bodyPr rtlCol="0" anchor="ctr"/>
+          <a:lstStyle/>
+          <a:p>
+            <a:r>
+              <a:rPr lang="en-GB" sz="1100" dirty="0">
+                <a:solidFill>
+                  <a:schemeClr val="bg1">
+                    <a:lumMod val="50000"/>
+                  </a:schemeClr>
+                </a:solidFill>
+              </a:rPr>
+              <a:t>The high number of misclassified MAP A signals into MAP B can be explained by looking directly at signals. See Appendix 2 for more details</a:t>
+            </a:r>
+          </a:p>
+        </p:txBody>
+      </p:sp>
     </p:spTree>
     <p:extLst>
       <p:ext uri="{BB962C8B-B14F-4D97-AF65-F5344CB8AC3E}">
@@ -21771,6 +21875,53 @@
           </a:p>
         </p:txBody>
       </p:sp>
+      <p:sp>
+        <p:nvSpPr>
+          <p:cNvPr id="3" name="Rettangolo con angoli arrotondati 2">
+            <a:extLst>
+              <a:ext uri="{FF2B5EF4-FFF2-40B4-BE49-F238E27FC236}">
+                <a16:creationId xmlns:a16="http://schemas.microsoft.com/office/drawing/2014/main" id="{38D33ABE-8AEA-73E6-7630-BE261E99518E}"/>
+              </a:ext>
+            </a:extLst>
+          </p:cNvPr>
+          <p:cNvSpPr/>
+          <p:nvPr/>
+        </p:nvSpPr>
+        <p:spPr>
+          <a:xfrm>
+            <a:off x="9810972" y="4498470"/>
+            <a:ext cx="1865376" cy="510608"/>
+          </a:xfrm>
+          <a:prstGeom prst="roundRect">
+            <a:avLst/>
+          </a:prstGeom>
+        </p:spPr>
+        <p:style>
+          <a:lnRef idx="1">
+            <a:schemeClr val="accent4"/>
+          </a:lnRef>
+          <a:fillRef idx="2">
+            <a:schemeClr val="accent4"/>
+          </a:fillRef>
+          <a:effectRef idx="1">
+            <a:schemeClr val="accent4"/>
+          </a:effectRef>
+          <a:fontRef idx="minor">
+            <a:schemeClr val="dk1"/>
+          </a:fontRef>
+        </p:style>
+        <p:txBody>
+          <a:bodyPr rtlCol="0" anchor="ctr"/>
+          <a:lstStyle/>
+          <a:p>
+            <a:pPr algn="ctr"/>
+            <a:r>
+              <a:rPr lang="en-GB" sz="1200"/>
+              <a:t>Ref trace: ECG L1 with R peak on 0.5s</a:t>
+            </a:r>
+          </a:p>
+        </p:txBody>
+      </p:sp>
       <p:grpSp>
         <p:nvGrpSpPr>
           <p:cNvPr id="28" name="Gruppo 27">
@@ -22076,6 +22227,41 @@
                                   </p:childTnLst>
                                 </p:cTn>
                               </p:par>
+                              <p:par>
+                                <p:cTn id="11" presetID="10" presetClass="exit" presetSubtype="0" fill="hold" grpId="0" nodeType="withEffect">
+                                  <p:stCondLst>
+                                    <p:cond delay="0"/>
+                                  </p:stCondLst>
+                                  <p:childTnLst>
+                                    <p:animEffect transition="out" filter="fade">
+                                      <p:cBhvr>
+                                        <p:cTn id="12" dur="500"/>
+                                        <p:tgtEl>
+                                          <p:spTgt spid="3"/>
+                                        </p:tgtEl>
+                                      </p:cBhvr>
+                                    </p:animEffect>
+                                    <p:set>
+                                      <p:cBhvr>
+                                        <p:cTn id="13" dur="1" fill="hold">
+                                          <p:stCondLst>
+                                            <p:cond delay="499"/>
+                                          </p:stCondLst>
+                                        </p:cTn>
+                                        <p:tgtEl>
+                                          <p:spTgt spid="3"/>
+                                        </p:tgtEl>
+                                        <p:attrNameLst>
+                                          <p:attrName>style.visibility</p:attrName>
+                                        </p:attrNameLst>
+                                      </p:cBhvr>
+                                      <p:to>
+                                        <p:strVal val="hidden"/>
+                                      </p:to>
+                                    </p:set>
+                                  </p:childTnLst>
+                                </p:cTn>
+                              </p:par>
                             </p:childTnLst>
                           </p:cTn>
                         </p:par>
@@ -22083,26 +22269,26 @@
                     </p:cTn>
                   </p:par>
                   <p:par>
-                    <p:cTn id="11" fill="hold">
+                    <p:cTn id="14" fill="hold">
                       <p:stCondLst>
                         <p:cond delay="indefinite"/>
                       </p:stCondLst>
                       <p:childTnLst>
                         <p:par>
-                          <p:cTn id="12" fill="hold">
+                          <p:cTn id="15" fill="hold">
                             <p:stCondLst>
                               <p:cond delay="0"/>
                             </p:stCondLst>
                             <p:childTnLst>
                               <p:par>
-                                <p:cTn id="13" presetID="2" presetClass="entr" presetSubtype="4" fill="hold" nodeType="clickEffect">
+                                <p:cTn id="16" presetID="2" presetClass="entr" presetSubtype="4" fill="hold" nodeType="clickEffect">
                                   <p:stCondLst>
                                     <p:cond delay="0"/>
                                   </p:stCondLst>
                                   <p:childTnLst>
                                     <p:set>
                                       <p:cBhvr>
-                                        <p:cTn id="14" dur="1" fill="hold">
+                                        <p:cTn id="17" dur="1" fill="hold">
                                           <p:stCondLst>
                                             <p:cond delay="0"/>
                                           </p:stCondLst>
@@ -22124,7 +22310,7 @@
                                     </p:set>
                                     <p:anim calcmode="lin" valueType="num">
                                       <p:cBhvr additive="base">
-                                        <p:cTn id="15" dur="500" fill="hold"/>
+                                        <p:cTn id="18" dur="500" fill="hold"/>
                                         <p:tgtEl>
                                           <p:spTgt spid="15">
                                             <p:txEl>
@@ -22151,7 +22337,7 @@
                                     </p:anim>
                                     <p:anim calcmode="lin" valueType="num">
                                       <p:cBhvr additive="base">
-                                        <p:cTn id="16" dur="500" fill="hold"/>
+                                        <p:cTn id="19" dur="500" fill="hold"/>
                                         <p:tgtEl>
                                           <p:spTgt spid="15">
                                             <p:txEl>
@@ -22180,14 +22366,14 @@
                                 </p:cTn>
                               </p:par>
                               <p:par>
-                                <p:cTn id="17" presetID="6" presetClass="entr" presetSubtype="32" fill="hold" nodeType="withEffect">
+                                <p:cTn id="20" presetID="6" presetClass="entr" presetSubtype="32" fill="hold" nodeType="withEffect">
                                   <p:stCondLst>
                                     <p:cond delay="0"/>
                                   </p:stCondLst>
                                   <p:childTnLst>
                                     <p:set>
                                       <p:cBhvr>
-                                        <p:cTn id="18" dur="1" fill="hold">
+                                        <p:cTn id="21" dur="1" fill="hold">
                                           <p:stCondLst>
                                             <p:cond delay="0"/>
                                           </p:stCondLst>
@@ -22205,7 +22391,7 @@
                                     </p:set>
                                     <p:animEffect transition="in" filter="circle(out)">
                                       <p:cBhvr>
-                                        <p:cTn id="19" dur="500"/>
+                                        <p:cTn id="22" dur="500"/>
                                         <p:tgtEl>
                                           <p:spTgt spid="28"/>
                                         </p:tgtEl>
@@ -22215,14 +22401,14 @@
                                 </p:cTn>
                               </p:par>
                               <p:par>
-                                <p:cTn id="20" presetID="2" presetClass="entr" presetSubtype="4" fill="hold" nodeType="withEffect">
+                                <p:cTn id="23" presetID="2" presetClass="entr" presetSubtype="4" fill="hold" nodeType="withEffect">
                                   <p:stCondLst>
                                     <p:cond delay="0"/>
                                   </p:stCondLst>
                                   <p:childTnLst>
                                     <p:set>
                                       <p:cBhvr>
-                                        <p:cTn id="21" dur="1" fill="hold">
+                                        <p:cTn id="24" dur="1" fill="hold">
                                           <p:stCondLst>
                                             <p:cond delay="0"/>
                                           </p:stCondLst>
@@ -22244,7 +22430,7 @@
                                     </p:set>
                                     <p:anim calcmode="lin" valueType="num">
                                       <p:cBhvr additive="base">
-                                        <p:cTn id="22" dur="500" fill="hold"/>
+                                        <p:cTn id="25" dur="500" fill="hold"/>
                                         <p:tgtEl>
                                           <p:spTgt spid="15">
                                             <p:txEl>
@@ -22271,7 +22457,7 @@
                                     </p:anim>
                                     <p:anim calcmode="lin" valueType="num">
                                       <p:cBhvr additive="base">
-                                        <p:cTn id="23" dur="500" fill="hold"/>
+                                        <p:cTn id="26" dur="500" fill="hold"/>
                                         <p:tgtEl>
                                           <p:spTgt spid="15">
                                             <p:txEl>
@@ -22300,14 +22486,14 @@
                                 </p:cTn>
                               </p:par>
                               <p:par>
-                                <p:cTn id="24" presetID="2" presetClass="entr" presetSubtype="4" fill="hold" nodeType="withEffect">
+                                <p:cTn id="27" presetID="2" presetClass="entr" presetSubtype="4" fill="hold" nodeType="withEffect">
                                   <p:stCondLst>
                                     <p:cond delay="0"/>
                                   </p:stCondLst>
                                   <p:childTnLst>
                                     <p:set>
                                       <p:cBhvr>
-                                        <p:cTn id="25" dur="1" fill="hold">
+                                        <p:cTn id="28" dur="1" fill="hold">
                                           <p:stCondLst>
                                             <p:cond delay="0"/>
                                           </p:stCondLst>
@@ -22329,7 +22515,7 @@
                                     </p:set>
                                     <p:anim calcmode="lin" valueType="num">
                                       <p:cBhvr additive="base">
-                                        <p:cTn id="26" dur="500" fill="hold"/>
+                                        <p:cTn id="29" dur="500" fill="hold"/>
                                         <p:tgtEl>
                                           <p:spTgt spid="15">
                                             <p:txEl>
@@ -22356,7 +22542,7 @@
                                     </p:anim>
                                     <p:anim calcmode="lin" valueType="num">
                                       <p:cBhvr additive="base">
-                                        <p:cTn id="27" dur="500" fill="hold"/>
+                                        <p:cTn id="30" dur="500" fill="hold"/>
                                         <p:tgtEl>
                                           <p:spTgt spid="15">
                                             <p:txEl>
@@ -22391,26 +22577,26 @@
                     </p:cTn>
                   </p:par>
                   <p:par>
-                    <p:cTn id="28" fill="hold">
+                    <p:cTn id="31" fill="hold">
                       <p:stCondLst>
                         <p:cond delay="indefinite"/>
                       </p:stCondLst>
                       <p:childTnLst>
                         <p:par>
-                          <p:cTn id="29" fill="hold">
+                          <p:cTn id="32" fill="hold">
                             <p:stCondLst>
                               <p:cond delay="0"/>
                             </p:stCondLst>
                             <p:childTnLst>
                               <p:par>
-                                <p:cTn id="30" presetID="2" presetClass="entr" presetSubtype="4" fill="hold" nodeType="clickEffect">
+                                <p:cTn id="33" presetID="2" presetClass="entr" presetSubtype="4" fill="hold" nodeType="clickEffect">
                                   <p:stCondLst>
                                     <p:cond delay="0"/>
                                   </p:stCondLst>
                                   <p:childTnLst>
                                     <p:set>
                                       <p:cBhvr>
-                                        <p:cTn id="31" dur="1" fill="hold">
+                                        <p:cTn id="34" dur="1" fill="hold">
                                           <p:stCondLst>
                                             <p:cond delay="0"/>
                                           </p:stCondLst>
@@ -22432,7 +22618,7 @@
                                     </p:set>
                                     <p:anim calcmode="lin" valueType="num">
                                       <p:cBhvr additive="base">
-                                        <p:cTn id="32" dur="500" fill="hold"/>
+                                        <p:cTn id="35" dur="500" fill="hold"/>
                                         <p:tgtEl>
                                           <p:spTgt spid="15">
                                             <p:txEl>
@@ -22459,7 +22645,7 @@
                                     </p:anim>
                                     <p:anim calcmode="lin" valueType="num">
                                       <p:cBhvr additive="base">
-                                        <p:cTn id="33" dur="500" fill="hold"/>
+                                        <p:cTn id="36" dur="500" fill="hold"/>
                                         <p:tgtEl>
                                           <p:spTgt spid="15">
                                             <p:txEl>
@@ -22514,6 +22700,9 @@
         </p:cTn>
       </p:par>
     </p:tnLst>
+    <p:bldLst>
+      <p:bldP spid="3" grpId="0" animBg="1"/>
+    </p:bldLst>
   </p:timing>
 </p:sld>
 </file>
@@ -23290,7 +23479,7 @@
         </p:nvGrpSpPr>
         <p:grpSpPr>
           <a:xfrm>
-            <a:off x="4901180" y="1504120"/>
+            <a:off x="4916424" y="1504120"/>
             <a:ext cx="6437376" cy="4776042"/>
             <a:chOff x="4745736" y="1504120"/>
             <a:chExt cx="6437376" cy="4776042"/>
@@ -23726,24 +23915,15 @@
                                   </p:childTnLst>
                                 </p:cTn>
                               </p:par>
-                            </p:childTnLst>
-                          </p:cTn>
-                        </p:par>
-                        <p:par>
-                          <p:cTn id="18" fill="hold">
-                            <p:stCondLst>
-                              <p:cond delay="500"/>
-                            </p:stCondLst>
-                            <p:childTnLst>
                               <p:par>
-                                <p:cTn id="19" presetID="10" presetClass="exit" presetSubtype="0" fill="hold" nodeType="afterEffect">
+                                <p:cTn id="18" presetID="10" presetClass="exit" presetSubtype="0" fill="hold" nodeType="withEffect">
                                   <p:stCondLst>
                                     <p:cond delay="0"/>
                                   </p:stCondLst>
                                   <p:childTnLst>
                                     <p:animEffect transition="out" filter="fade">
                                       <p:cBhvr>
-                                        <p:cTn id="20" dur="500"/>
+                                        <p:cTn id="19" dur="500"/>
                                         <p:tgtEl>
                                           <p:spTgt spid="14"/>
                                         </p:tgtEl>
@@ -23751,7 +23931,7 @@
                                     </p:animEffect>
                                     <p:set>
                                       <p:cBhvr>
-                                        <p:cTn id="21" dur="1" fill="hold">
+                                        <p:cTn id="20" dur="1" fill="hold">
                                           <p:stCondLst>
                                             <p:cond delay="499"/>
                                           </p:stCondLst>
@@ -23770,24 +23950,15 @@
                                   </p:childTnLst>
                                 </p:cTn>
                               </p:par>
-                            </p:childTnLst>
-                          </p:cTn>
-                        </p:par>
-                        <p:par>
-                          <p:cTn id="22" fill="hold">
-                            <p:stCondLst>
-                              <p:cond delay="1000"/>
-                            </p:stCondLst>
-                            <p:childTnLst>
                               <p:par>
-                                <p:cTn id="23" presetID="6" presetClass="entr" presetSubtype="32" fill="hold" nodeType="afterEffect">
+                                <p:cTn id="21" presetID="6" presetClass="entr" presetSubtype="32" fill="hold" nodeType="withEffect">
                                   <p:stCondLst>
                                     <p:cond delay="0"/>
                                   </p:stCondLst>
                                   <p:childTnLst>
                                     <p:set>
                                       <p:cBhvr>
-                                        <p:cTn id="24" dur="1" fill="hold">
+                                        <p:cTn id="22" dur="1" fill="hold">
                                           <p:stCondLst>
                                             <p:cond delay="0"/>
                                           </p:stCondLst>
@@ -23805,7 +23976,7 @@
                                     </p:set>
                                     <p:animEffect transition="in" filter="circle(out)">
                                       <p:cBhvr>
-                                        <p:cTn id="25" dur="500"/>
+                                        <p:cTn id="23" dur="500"/>
                                         <p:tgtEl>
                                           <p:spTgt spid="12"/>
                                         </p:tgtEl>
@@ -23821,26 +23992,26 @@
                     </p:cTn>
                   </p:par>
                   <p:par>
-                    <p:cTn id="26" fill="hold">
+                    <p:cTn id="24" fill="hold">
                       <p:stCondLst>
                         <p:cond delay="indefinite"/>
                       </p:stCondLst>
                       <p:childTnLst>
                         <p:par>
-                          <p:cTn id="27" fill="hold">
+                          <p:cTn id="25" fill="hold">
                             <p:stCondLst>
                               <p:cond delay="0"/>
                             </p:stCondLst>
                             <p:childTnLst>
                               <p:par>
-                                <p:cTn id="28" presetID="2" presetClass="entr" presetSubtype="4" fill="hold" nodeType="clickEffect">
+                                <p:cTn id="26" presetID="2" presetClass="entr" presetSubtype="4" fill="hold" nodeType="clickEffect">
                                   <p:stCondLst>
                                     <p:cond delay="0"/>
                                   </p:stCondLst>
                                   <p:childTnLst>
                                     <p:set>
                                       <p:cBhvr>
-                                        <p:cTn id="29" dur="1" fill="hold">
+                                        <p:cTn id="27" dur="1" fill="hold">
                                           <p:stCondLst>
                                             <p:cond delay="0"/>
                                           </p:stCondLst>
@@ -23862,7 +24033,7 @@
                                     </p:set>
                                     <p:anim calcmode="lin" valueType="num">
                                       <p:cBhvr additive="base">
-                                        <p:cTn id="30" dur="500" fill="hold"/>
+                                        <p:cTn id="28" dur="500" fill="hold"/>
                                         <p:tgtEl>
                                           <p:spTgt spid="15">
                                             <p:txEl>
@@ -23889,7 +24060,7 @@
                                     </p:anim>
                                     <p:anim calcmode="lin" valueType="num">
                                       <p:cBhvr additive="base">
-                                        <p:cTn id="31" dur="500" fill="hold"/>
+                                        <p:cTn id="29" dur="500" fill="hold"/>
                                         <p:tgtEl>
                                           <p:spTgt spid="15">
                                             <p:txEl>
@@ -23917,6 +24088,76 @@
                                   </p:childTnLst>
                                 </p:cTn>
                               </p:par>
+                              <p:par>
+                                <p:cTn id="30" presetID="10" presetClass="exit" presetSubtype="0" fill="hold" nodeType="withEffect">
+                                  <p:stCondLst>
+                                    <p:cond delay="0"/>
+                                  </p:stCondLst>
+                                  <p:childTnLst>
+                                    <p:animEffect transition="out" filter="fade">
+                                      <p:cBhvr>
+                                        <p:cTn id="31" dur="500"/>
+                                        <p:tgtEl>
+                                          <p:spTgt spid="12"/>
+                                        </p:tgtEl>
+                                      </p:cBhvr>
+                                    </p:animEffect>
+                                    <p:set>
+                                      <p:cBhvr>
+                                        <p:cTn id="32" dur="1" fill="hold">
+                                          <p:stCondLst>
+                                            <p:cond delay="499"/>
+                                          </p:stCondLst>
+                                        </p:cTn>
+                                        <p:tgtEl>
+                                          <p:spTgt spid="12"/>
+                                        </p:tgtEl>
+                                        <p:attrNameLst>
+                                          <p:attrName>style.visibility</p:attrName>
+                                        </p:attrNameLst>
+                                      </p:cBhvr>
+                                      <p:to>
+                                        <p:strVal val="hidden"/>
+                                      </p:to>
+                                    </p:set>
+                                  </p:childTnLst>
+                                </p:cTn>
+                              </p:par>
+                              <p:par>
+                                <p:cTn id="33" presetID="6" presetClass="entr" presetSubtype="32" fill="hold" nodeType="withEffect">
+                                  <p:stCondLst>
+                                    <p:cond delay="0"/>
+                                  </p:stCondLst>
+                                  <p:childTnLst>
+                                    <p:set>
+                                      <p:cBhvr>
+                                        <p:cTn id="34" dur="1" fill="hold">
+                                          <p:stCondLst>
+                                            <p:cond delay="0"/>
+                                          </p:stCondLst>
+                                        </p:cTn>
+                                        <p:tgtEl>
+                                          <p:spTgt spid="19"/>
+                                        </p:tgtEl>
+                                        <p:attrNameLst>
+                                          <p:attrName>style.visibility</p:attrName>
+                                        </p:attrNameLst>
+                                      </p:cBhvr>
+                                      <p:to>
+                                        <p:strVal val="visible"/>
+                                      </p:to>
+                                    </p:set>
+                                    <p:animEffect transition="in" filter="circle(out)">
+                                      <p:cBhvr>
+                                        <p:cTn id="35" dur="500"/>
+                                        <p:tgtEl>
+                                          <p:spTgt spid="19"/>
+                                        </p:tgtEl>
+                                      </p:cBhvr>
+                                    </p:animEffect>
+                                  </p:childTnLst>
+                                </p:cTn>
+                              </p:par>
                             </p:childTnLst>
                           </p:cTn>
                         </p:par>
@@ -23924,26 +24165,26 @@
                     </p:cTn>
                   </p:par>
                   <p:par>
-                    <p:cTn id="32" fill="hold">
+                    <p:cTn id="36" fill="hold">
                       <p:stCondLst>
                         <p:cond delay="indefinite"/>
                       </p:stCondLst>
                       <p:childTnLst>
                         <p:par>
-                          <p:cTn id="33" fill="hold">
+                          <p:cTn id="37" fill="hold">
                             <p:stCondLst>
                               <p:cond delay="0"/>
                             </p:stCondLst>
                             <p:childTnLst>
                               <p:par>
-                                <p:cTn id="34" presetID="2" presetClass="entr" presetSubtype="4" fill="hold" nodeType="clickEffect">
+                                <p:cTn id="38" presetID="2" presetClass="entr" presetSubtype="4" fill="hold" nodeType="clickEffect">
                                   <p:stCondLst>
                                     <p:cond delay="0"/>
                                   </p:stCondLst>
                                   <p:childTnLst>
                                     <p:set>
                                       <p:cBhvr>
-                                        <p:cTn id="35" dur="1" fill="hold">
+                                        <p:cTn id="39" dur="1" fill="hold">
                                           <p:stCondLst>
                                             <p:cond delay="0"/>
                                           </p:stCondLst>
@@ -23965,7 +24206,7 @@
                                     </p:set>
                                     <p:anim calcmode="lin" valueType="num">
                                       <p:cBhvr additive="base">
-                                        <p:cTn id="36" dur="500" fill="hold"/>
+                                        <p:cTn id="40" dur="500" fill="hold"/>
                                         <p:tgtEl>
                                           <p:spTgt spid="15">
                                             <p:txEl>
@@ -23992,7 +24233,7 @@
                                     </p:anim>
                                     <p:anim calcmode="lin" valueType="num">
                                       <p:cBhvr additive="base">
-                                        <p:cTn id="37" dur="500" fill="hold"/>
+                                        <p:cTn id="41" dur="500" fill="hold"/>
                                         <p:tgtEl>
                                           <p:spTgt spid="15">
                                             <p:txEl>
@@ -24021,60 +24262,24 @@
                                 </p:cTn>
                               </p:par>
                               <p:par>
-                                <p:cTn id="38" presetID="10" presetClass="exit" presetSubtype="0" fill="hold" nodeType="withEffect">
+                                <p:cTn id="42" presetID="10" presetClass="exit" presetSubtype="0" fill="hold" nodeType="withEffect">
                                   <p:stCondLst>
                                     <p:cond delay="0"/>
                                   </p:stCondLst>
                                   <p:childTnLst>
                                     <p:animEffect transition="out" filter="fade">
                                       <p:cBhvr>
-                                        <p:cTn id="39" dur="500"/>
+                                        <p:cTn id="43" dur="500"/>
                                         <p:tgtEl>
-                                          <p:spTgt spid="12"/>
+                                          <p:spTgt spid="19"/>
                                         </p:tgtEl>
                                       </p:cBhvr>
                                     </p:animEffect>
                                     <p:set>
                                       <p:cBhvr>
-                                        <p:cTn id="40" dur="1" fill="hold">
+                                        <p:cTn id="44" dur="1" fill="hold">
                                           <p:stCondLst>
                                             <p:cond delay="499"/>
-                                          </p:stCondLst>
-                                        </p:cTn>
-                                        <p:tgtEl>
-                                          <p:spTgt spid="12"/>
-                                        </p:tgtEl>
-                                        <p:attrNameLst>
-                                          <p:attrName>style.visibility</p:attrName>
-                                        </p:attrNameLst>
-                                      </p:cBhvr>
-                                      <p:to>
-                                        <p:strVal val="hidden"/>
-                                      </p:to>
-                                    </p:set>
-                                  </p:childTnLst>
-                                </p:cTn>
-                              </p:par>
-                            </p:childTnLst>
-                          </p:cTn>
-                        </p:par>
-                        <p:par>
-                          <p:cTn id="41" fill="hold">
-                            <p:stCondLst>
-                              <p:cond delay="500"/>
-                            </p:stCondLst>
-                            <p:childTnLst>
-                              <p:par>
-                                <p:cTn id="42" presetID="6" presetClass="entr" presetSubtype="32" fill="hold" nodeType="afterEffect">
-                                  <p:stCondLst>
-                                    <p:cond delay="0"/>
-                                  </p:stCondLst>
-                                  <p:childTnLst>
-                                    <p:set>
-                                      <p:cBhvr>
-                                        <p:cTn id="43" dur="1" fill="hold">
-                                          <p:stCondLst>
-                                            <p:cond delay="0"/>
                                           </p:stCondLst>
                                         </p:cTn>
                                         <p:tgtEl>
@@ -24085,17 +24290,9 @@
                                         </p:attrNameLst>
                                       </p:cBhvr>
                                       <p:to>
-                                        <p:strVal val="visible"/>
+                                        <p:strVal val="hidden"/>
                                       </p:to>
                                     </p:set>
-                                    <p:animEffect transition="in" filter="circle(out)">
-                                      <p:cBhvr>
-                                        <p:cTn id="44" dur="500"/>
-                                        <p:tgtEl>
-                                          <p:spTgt spid="19"/>
-                                        </p:tgtEl>
-                                      </p:cBhvr>
-                                    </p:animEffect>
                                   </p:childTnLst>
                                 </p:cTn>
                               </p:par>
@@ -26080,6 +26277,58 @@
           </a:p>
           <a:p>
             <a:endParaRPr lang="en-US" sz="1600" dirty="0"/>
+          </a:p>
+        </p:txBody>
+      </p:sp>
+      <p:sp>
+        <p:nvSpPr>
+          <p:cNvPr id="3" name="Rettangolo con angoli arrotondati 2">
+            <a:extLst>
+              <a:ext uri="{FF2B5EF4-FFF2-40B4-BE49-F238E27FC236}">
+                <a16:creationId xmlns:a16="http://schemas.microsoft.com/office/drawing/2014/main" id="{6A550A61-661A-B1EE-A3E0-E375FB4C4E72}"/>
+              </a:ext>
+            </a:extLst>
+          </p:cNvPr>
+          <p:cNvSpPr/>
+          <p:nvPr/>
+        </p:nvSpPr>
+        <p:spPr>
+          <a:xfrm>
+            <a:off x="8498037" y="5705527"/>
+            <a:ext cx="2945569" cy="577939"/>
+          </a:xfrm>
+          <a:prstGeom prst="roundRect">
+            <a:avLst/>
+          </a:prstGeom>
+        </p:spPr>
+        <p:style>
+          <a:lnRef idx="1">
+            <a:schemeClr val="accent3"/>
+          </a:lnRef>
+          <a:fillRef idx="2">
+            <a:schemeClr val="accent3"/>
+          </a:fillRef>
+          <a:effectRef idx="1">
+            <a:schemeClr val="accent3"/>
+          </a:effectRef>
+          <a:fontRef idx="minor">
+            <a:schemeClr val="dk1"/>
+          </a:fontRef>
+        </p:style>
+        <p:txBody>
+          <a:bodyPr rtlCol="0" anchor="ctr"/>
+          <a:lstStyle/>
+          <a:p>
+            <a:r>
+              <a:rPr lang="en-GB" sz="1100" dirty="0">
+                <a:solidFill>
+                  <a:schemeClr val="bg1">
+                    <a:lumMod val="50000"/>
+                  </a:schemeClr>
+                </a:solidFill>
+              </a:rPr>
+              <a:t>These priors have been defined on the bases of experience: what if a preprocessing step proceeded the classification? See Appendix 3.</a:t>
+            </a:r>
           </a:p>
         </p:txBody>
       </p:sp>

</xml_diff>